<commit_message>
fix: sintyoku-1.ppt by o
some problem fixed
</commit_message>
<xml_diff>
--- a/shintyoku_1.pptx
+++ b/shintyoku_1.pptx
@@ -4,6 +4,9 @@
   <p:sldMasterIdLst>
     <p:sldMasterId id="2147483668" r:id="rId1"/>
   </p:sldMasterIdLst>
+  <p:notesMasterIdLst>
+    <p:notesMasterId r:id="rId6"/>
+  </p:notesMasterIdLst>
   <p:sldIdLst>
     <p:sldId id="256" r:id="rId2"/>
     <p:sldId id="257" r:id="rId3"/>
@@ -113,6 +116,472 @@
     </p:ext>
   </p:extLst>
 </p:presentation>
+</file>
+
+<file path=ppt/notesMasters/notesMaster1.xml><?xml version="1.0" encoding="utf-8"?>
+<p:notesMaster xmlns:a="http://schemas.openxmlformats.org/drawingml/2006/main" xmlns:r="http://schemas.openxmlformats.org/officeDocument/2006/relationships" xmlns:p="http://schemas.openxmlformats.org/presentationml/2006/main">
+  <p:cSld>
+    <p:bg>
+      <p:bgRef idx="1001">
+        <a:schemeClr val="bg1"/>
+      </p:bgRef>
+    </p:bg>
+    <p:spTree>
+      <p:nvGrpSpPr>
+        <p:cNvPr id="1" name=""/>
+        <p:cNvGrpSpPr/>
+        <p:nvPr/>
+      </p:nvGrpSpPr>
+      <p:grpSpPr>
+        <a:xfrm>
+          <a:off x="0" y="0"/>
+          <a:ext cx="0" cy="0"/>
+          <a:chOff x="0" y="0"/>
+          <a:chExt cx="0" cy="0"/>
+        </a:xfrm>
+      </p:grpSpPr>
+      <p:sp>
+        <p:nvSpPr>
+          <p:cNvPr id="2" name="ヘッダー プレースホルダー 1"/>
+          <p:cNvSpPr>
+            <a:spLocks noGrp="1"/>
+          </p:cNvSpPr>
+          <p:nvPr>
+            <p:ph type="hdr" sz="quarter"/>
+          </p:nvPr>
+        </p:nvSpPr>
+        <p:spPr>
+          <a:xfrm>
+            <a:off x="0" y="0"/>
+            <a:ext cx="2971800" cy="458788"/>
+          </a:xfrm>
+          <a:prstGeom prst="rect">
+            <a:avLst/>
+          </a:prstGeom>
+        </p:spPr>
+        <p:txBody>
+          <a:bodyPr vert="horz" lIns="91440" tIns="45720" rIns="91440" bIns="45720" rtlCol="0"/>
+          <a:lstStyle>
+            <a:lvl1pPr algn="l">
+              <a:defRPr sz="1200"/>
+            </a:lvl1pPr>
+          </a:lstStyle>
+          <a:p>
+            <a:endParaRPr kumimoji="1" lang="ja-JP" altLang="en-US"/>
+          </a:p>
+        </p:txBody>
+      </p:sp>
+      <p:sp>
+        <p:nvSpPr>
+          <p:cNvPr id="3" name="日付プレースホルダー 2"/>
+          <p:cNvSpPr>
+            <a:spLocks noGrp="1"/>
+          </p:cNvSpPr>
+          <p:nvPr>
+            <p:ph type="dt" idx="1"/>
+          </p:nvPr>
+        </p:nvSpPr>
+        <p:spPr>
+          <a:xfrm>
+            <a:off x="3884613" y="0"/>
+            <a:ext cx="2971800" cy="458788"/>
+          </a:xfrm>
+          <a:prstGeom prst="rect">
+            <a:avLst/>
+          </a:prstGeom>
+        </p:spPr>
+        <p:txBody>
+          <a:bodyPr vert="horz" lIns="91440" tIns="45720" rIns="91440" bIns="45720" rtlCol="0"/>
+          <a:lstStyle>
+            <a:lvl1pPr algn="r">
+              <a:defRPr sz="1200"/>
+            </a:lvl1pPr>
+          </a:lstStyle>
+          <a:p>
+            <a:fld id="{2E6429B9-BC4F-4739-884C-A1F375CE51E1}" type="datetimeFigureOut">
+              <a:rPr kumimoji="1" lang="ja-JP" altLang="en-US" smtClean="0"/>
+              <a:t>2020/5/15</a:t>
+            </a:fld>
+            <a:endParaRPr kumimoji="1" lang="ja-JP" altLang="en-US"/>
+          </a:p>
+        </p:txBody>
+      </p:sp>
+      <p:sp>
+        <p:nvSpPr>
+          <p:cNvPr id="4" name="スライド イメージ プレースホルダー 3"/>
+          <p:cNvSpPr>
+            <a:spLocks noGrp="1" noRot="1" noChangeAspect="1"/>
+          </p:cNvSpPr>
+          <p:nvPr>
+            <p:ph type="sldImg" idx="2"/>
+          </p:nvPr>
+        </p:nvSpPr>
+        <p:spPr>
+          <a:xfrm>
+            <a:off x="685800" y="1143000"/>
+            <a:ext cx="5486400" cy="3086100"/>
+          </a:xfrm>
+          <a:prstGeom prst="rect">
+            <a:avLst/>
+          </a:prstGeom>
+          <a:noFill/>
+          <a:ln w="12700">
+            <a:solidFill>
+              <a:prstClr val="black"/>
+            </a:solidFill>
+          </a:ln>
+        </p:spPr>
+        <p:txBody>
+          <a:bodyPr vert="horz" lIns="91440" tIns="45720" rIns="91440" bIns="45720" rtlCol="0" anchor="ctr"/>
+          <a:lstStyle/>
+          <a:p>
+            <a:endParaRPr lang="ja-JP" altLang="en-US"/>
+          </a:p>
+        </p:txBody>
+      </p:sp>
+      <p:sp>
+        <p:nvSpPr>
+          <p:cNvPr id="5" name="ノート プレースホルダー 4"/>
+          <p:cNvSpPr>
+            <a:spLocks noGrp="1"/>
+          </p:cNvSpPr>
+          <p:nvPr>
+            <p:ph type="body" sz="quarter" idx="3"/>
+          </p:nvPr>
+        </p:nvSpPr>
+        <p:spPr>
+          <a:xfrm>
+            <a:off x="685800" y="4400550"/>
+            <a:ext cx="5486400" cy="3600450"/>
+          </a:xfrm>
+          <a:prstGeom prst="rect">
+            <a:avLst/>
+          </a:prstGeom>
+        </p:spPr>
+        <p:txBody>
+          <a:bodyPr vert="horz" lIns="91440" tIns="45720" rIns="91440" bIns="45720" rtlCol="0"/>
+          <a:lstStyle/>
+          <a:p>
+            <a:pPr lvl="0"/>
+            <a:r>
+              <a:rPr kumimoji="1" lang="ja-JP" altLang="en-US" smtClean="0"/>
+              <a:t>マスター テキストの書式設定</a:t>
+            </a:r>
+          </a:p>
+          <a:p>
+            <a:pPr lvl="1"/>
+            <a:r>
+              <a:rPr kumimoji="1" lang="ja-JP" altLang="en-US" smtClean="0"/>
+              <a:t>第 </a:t>
+            </a:r>
+            <a:r>
+              <a:rPr kumimoji="1" lang="en-US" altLang="ja-JP" smtClean="0"/>
+              <a:t>2 </a:t>
+            </a:r>
+            <a:r>
+              <a:rPr kumimoji="1" lang="ja-JP" altLang="en-US" smtClean="0"/>
+              <a:t>レベル</a:t>
+            </a:r>
+          </a:p>
+          <a:p>
+            <a:pPr lvl="2"/>
+            <a:r>
+              <a:rPr kumimoji="1" lang="ja-JP" altLang="en-US" smtClean="0"/>
+              <a:t>第 </a:t>
+            </a:r>
+            <a:r>
+              <a:rPr kumimoji="1" lang="en-US" altLang="ja-JP" smtClean="0"/>
+              <a:t>3 </a:t>
+            </a:r>
+            <a:r>
+              <a:rPr kumimoji="1" lang="ja-JP" altLang="en-US" smtClean="0"/>
+              <a:t>レベル</a:t>
+            </a:r>
+          </a:p>
+          <a:p>
+            <a:pPr lvl="3"/>
+            <a:r>
+              <a:rPr kumimoji="1" lang="ja-JP" altLang="en-US" smtClean="0"/>
+              <a:t>第 </a:t>
+            </a:r>
+            <a:r>
+              <a:rPr kumimoji="1" lang="en-US" altLang="ja-JP" smtClean="0"/>
+              <a:t>4 </a:t>
+            </a:r>
+            <a:r>
+              <a:rPr kumimoji="1" lang="ja-JP" altLang="en-US" smtClean="0"/>
+              <a:t>レベル</a:t>
+            </a:r>
+          </a:p>
+          <a:p>
+            <a:pPr lvl="4"/>
+            <a:r>
+              <a:rPr kumimoji="1" lang="ja-JP" altLang="en-US" smtClean="0"/>
+              <a:t>第 </a:t>
+            </a:r>
+            <a:r>
+              <a:rPr kumimoji="1" lang="en-US" altLang="ja-JP" smtClean="0"/>
+              <a:t>5 </a:t>
+            </a:r>
+            <a:r>
+              <a:rPr kumimoji="1" lang="ja-JP" altLang="en-US" smtClean="0"/>
+              <a:t>レベル</a:t>
+            </a:r>
+            <a:endParaRPr kumimoji="1" lang="ja-JP" altLang="en-US"/>
+          </a:p>
+        </p:txBody>
+      </p:sp>
+      <p:sp>
+        <p:nvSpPr>
+          <p:cNvPr id="6" name="フッター プレースホルダー 5"/>
+          <p:cNvSpPr>
+            <a:spLocks noGrp="1"/>
+          </p:cNvSpPr>
+          <p:nvPr>
+            <p:ph type="ftr" sz="quarter" idx="4"/>
+          </p:nvPr>
+        </p:nvSpPr>
+        <p:spPr>
+          <a:xfrm>
+            <a:off x="0" y="8685213"/>
+            <a:ext cx="2971800" cy="458787"/>
+          </a:xfrm>
+          <a:prstGeom prst="rect">
+            <a:avLst/>
+          </a:prstGeom>
+        </p:spPr>
+        <p:txBody>
+          <a:bodyPr vert="horz" lIns="91440" tIns="45720" rIns="91440" bIns="45720" rtlCol="0" anchor="b"/>
+          <a:lstStyle>
+            <a:lvl1pPr algn="l">
+              <a:defRPr sz="1200"/>
+            </a:lvl1pPr>
+          </a:lstStyle>
+          <a:p>
+            <a:endParaRPr kumimoji="1" lang="ja-JP" altLang="en-US"/>
+          </a:p>
+        </p:txBody>
+      </p:sp>
+      <p:sp>
+        <p:nvSpPr>
+          <p:cNvPr id="7" name="スライド番号プレースホルダー 6"/>
+          <p:cNvSpPr>
+            <a:spLocks noGrp="1"/>
+          </p:cNvSpPr>
+          <p:nvPr>
+            <p:ph type="sldNum" sz="quarter" idx="5"/>
+          </p:nvPr>
+        </p:nvSpPr>
+        <p:spPr>
+          <a:xfrm>
+            <a:off x="3884613" y="8685213"/>
+            <a:ext cx="2971800" cy="458787"/>
+          </a:xfrm>
+          <a:prstGeom prst="rect">
+            <a:avLst/>
+          </a:prstGeom>
+        </p:spPr>
+        <p:txBody>
+          <a:bodyPr vert="horz" lIns="91440" tIns="45720" rIns="91440" bIns="45720" rtlCol="0" anchor="b"/>
+          <a:lstStyle>
+            <a:lvl1pPr algn="r">
+              <a:defRPr sz="1200"/>
+            </a:lvl1pPr>
+          </a:lstStyle>
+          <a:p>
+            <a:fld id="{2835AA72-3E92-4687-81B8-4A60C3CBECA3}" type="slidenum">
+              <a:rPr kumimoji="1" lang="ja-JP" altLang="en-US" smtClean="0"/>
+              <a:t>‹#›</a:t>
+            </a:fld>
+            <a:endParaRPr kumimoji="1" lang="ja-JP" altLang="en-US"/>
+          </a:p>
+        </p:txBody>
+      </p:sp>
+    </p:spTree>
+    <p:extLst>
+      <p:ext uri="{BB962C8B-B14F-4D97-AF65-F5344CB8AC3E}">
+        <p14:creationId xmlns:p14="http://schemas.microsoft.com/office/powerpoint/2010/main" val="2542510354"/>
+      </p:ext>
+    </p:extLst>
+  </p:cSld>
+  <p:clrMap bg1="lt1" tx1="dk1" bg2="lt2" tx2="dk2" accent1="accent1" accent2="accent2" accent3="accent3" accent4="accent4" accent5="accent5" accent6="accent6" hlink="hlink" folHlink="folHlink"/>
+  <p:notesStyle>
+    <a:lvl1pPr marL="0" algn="l" defTabSz="914400" rtl="0" eaLnBrk="1" latinLnBrk="0" hangingPunct="1">
+      <a:defRPr kumimoji="1" sz="1200" kern="1200">
+        <a:solidFill>
+          <a:schemeClr val="tx1"/>
+        </a:solidFill>
+        <a:latin typeface="+mn-lt"/>
+        <a:ea typeface="+mn-ea"/>
+        <a:cs typeface="+mn-cs"/>
+      </a:defRPr>
+    </a:lvl1pPr>
+    <a:lvl2pPr marL="457200" algn="l" defTabSz="914400" rtl="0" eaLnBrk="1" latinLnBrk="0" hangingPunct="1">
+      <a:defRPr kumimoji="1" sz="1200" kern="1200">
+        <a:solidFill>
+          <a:schemeClr val="tx1"/>
+        </a:solidFill>
+        <a:latin typeface="+mn-lt"/>
+        <a:ea typeface="+mn-ea"/>
+        <a:cs typeface="+mn-cs"/>
+      </a:defRPr>
+    </a:lvl2pPr>
+    <a:lvl3pPr marL="914400" algn="l" defTabSz="914400" rtl="0" eaLnBrk="1" latinLnBrk="0" hangingPunct="1">
+      <a:defRPr kumimoji="1" sz="1200" kern="1200">
+        <a:solidFill>
+          <a:schemeClr val="tx1"/>
+        </a:solidFill>
+        <a:latin typeface="+mn-lt"/>
+        <a:ea typeface="+mn-ea"/>
+        <a:cs typeface="+mn-cs"/>
+      </a:defRPr>
+    </a:lvl3pPr>
+    <a:lvl4pPr marL="1371600" algn="l" defTabSz="914400" rtl="0" eaLnBrk="1" latinLnBrk="0" hangingPunct="1">
+      <a:defRPr kumimoji="1" sz="1200" kern="1200">
+        <a:solidFill>
+          <a:schemeClr val="tx1"/>
+        </a:solidFill>
+        <a:latin typeface="+mn-lt"/>
+        <a:ea typeface="+mn-ea"/>
+        <a:cs typeface="+mn-cs"/>
+      </a:defRPr>
+    </a:lvl4pPr>
+    <a:lvl5pPr marL="1828800" algn="l" defTabSz="914400" rtl="0" eaLnBrk="1" latinLnBrk="0" hangingPunct="1">
+      <a:defRPr kumimoji="1" sz="1200" kern="1200">
+        <a:solidFill>
+          <a:schemeClr val="tx1"/>
+        </a:solidFill>
+        <a:latin typeface="+mn-lt"/>
+        <a:ea typeface="+mn-ea"/>
+        <a:cs typeface="+mn-cs"/>
+      </a:defRPr>
+    </a:lvl5pPr>
+    <a:lvl6pPr marL="2286000" algn="l" defTabSz="914400" rtl="0" eaLnBrk="1" latinLnBrk="0" hangingPunct="1">
+      <a:defRPr kumimoji="1" sz="1200" kern="1200">
+        <a:solidFill>
+          <a:schemeClr val="tx1"/>
+        </a:solidFill>
+        <a:latin typeface="+mn-lt"/>
+        <a:ea typeface="+mn-ea"/>
+        <a:cs typeface="+mn-cs"/>
+      </a:defRPr>
+    </a:lvl6pPr>
+    <a:lvl7pPr marL="2743200" algn="l" defTabSz="914400" rtl="0" eaLnBrk="1" latinLnBrk="0" hangingPunct="1">
+      <a:defRPr kumimoji="1" sz="1200" kern="1200">
+        <a:solidFill>
+          <a:schemeClr val="tx1"/>
+        </a:solidFill>
+        <a:latin typeface="+mn-lt"/>
+        <a:ea typeface="+mn-ea"/>
+        <a:cs typeface="+mn-cs"/>
+      </a:defRPr>
+    </a:lvl7pPr>
+    <a:lvl8pPr marL="3200400" algn="l" defTabSz="914400" rtl="0" eaLnBrk="1" latinLnBrk="0" hangingPunct="1">
+      <a:defRPr kumimoji="1" sz="1200" kern="1200">
+        <a:solidFill>
+          <a:schemeClr val="tx1"/>
+        </a:solidFill>
+        <a:latin typeface="+mn-lt"/>
+        <a:ea typeface="+mn-ea"/>
+        <a:cs typeface="+mn-cs"/>
+      </a:defRPr>
+    </a:lvl8pPr>
+    <a:lvl9pPr marL="3657600" algn="l" defTabSz="914400" rtl="0" eaLnBrk="1" latinLnBrk="0" hangingPunct="1">
+      <a:defRPr kumimoji="1" sz="1200" kern="1200">
+        <a:solidFill>
+          <a:schemeClr val="tx1"/>
+        </a:solidFill>
+        <a:latin typeface="+mn-lt"/>
+        <a:ea typeface="+mn-ea"/>
+        <a:cs typeface="+mn-cs"/>
+      </a:defRPr>
+    </a:lvl9pPr>
+  </p:notesStyle>
+</p:notesMaster>
+</file>
+
+<file path=ppt/notesSlides/notesSlide1.xml><?xml version="1.0" encoding="utf-8"?>
+<p:notes xmlns:a="http://schemas.openxmlformats.org/drawingml/2006/main" xmlns:r="http://schemas.openxmlformats.org/officeDocument/2006/relationships" xmlns:p="http://schemas.openxmlformats.org/presentationml/2006/main">
+  <p:cSld>
+    <p:spTree>
+      <p:nvGrpSpPr>
+        <p:cNvPr id="1" name=""/>
+        <p:cNvGrpSpPr/>
+        <p:nvPr/>
+      </p:nvGrpSpPr>
+      <p:grpSpPr>
+        <a:xfrm>
+          <a:off x="0" y="0"/>
+          <a:ext cx="0" cy="0"/>
+          <a:chOff x="0" y="0"/>
+          <a:chExt cx="0" cy="0"/>
+        </a:xfrm>
+      </p:grpSpPr>
+      <p:sp>
+        <p:nvSpPr>
+          <p:cNvPr id="2" name="スライド イメージ プレースホルダー 1"/>
+          <p:cNvSpPr>
+            <a:spLocks noGrp="1" noRot="1" noChangeAspect="1"/>
+          </p:cNvSpPr>
+          <p:nvPr>
+            <p:ph type="sldImg"/>
+          </p:nvPr>
+        </p:nvSpPr>
+        <p:spPr/>
+      </p:sp>
+      <p:sp>
+        <p:nvSpPr>
+          <p:cNvPr id="3" name="ノート プレースホルダー 2"/>
+          <p:cNvSpPr>
+            <a:spLocks noGrp="1"/>
+          </p:cNvSpPr>
+          <p:nvPr>
+            <p:ph type="body" idx="1"/>
+          </p:nvPr>
+        </p:nvSpPr>
+        <p:spPr/>
+        <p:txBody>
+          <a:bodyPr/>
+          <a:lstStyle/>
+          <a:p>
+            <a:endParaRPr kumimoji="1" lang="ja-JP" altLang="en-US"/>
+          </a:p>
+        </p:txBody>
+      </p:sp>
+      <p:sp>
+        <p:nvSpPr>
+          <p:cNvPr id="4" name="スライド番号プレースホルダー 3"/>
+          <p:cNvSpPr>
+            <a:spLocks noGrp="1"/>
+          </p:cNvSpPr>
+          <p:nvPr>
+            <p:ph type="sldNum" sz="quarter" idx="10"/>
+          </p:nvPr>
+        </p:nvSpPr>
+        <p:spPr/>
+        <p:txBody>
+          <a:bodyPr/>
+          <a:lstStyle/>
+          <a:p>
+            <a:fld id="{2835AA72-3E92-4687-81B8-4A60C3CBECA3}" type="slidenum">
+              <a:rPr kumimoji="1" lang="ja-JP" altLang="en-US" smtClean="0"/>
+              <a:t>4</a:t>
+            </a:fld>
+            <a:endParaRPr kumimoji="1" lang="ja-JP" altLang="en-US"/>
+          </a:p>
+        </p:txBody>
+      </p:sp>
+    </p:spTree>
+    <p:extLst>
+      <p:ext uri="{BB962C8B-B14F-4D97-AF65-F5344CB8AC3E}">
+        <p14:creationId xmlns:p14="http://schemas.microsoft.com/office/powerpoint/2010/main" val="2218218802"/>
+      </p:ext>
+    </p:extLst>
+  </p:cSld>
+  <p:clrMapOvr>
+    <a:masterClrMapping/>
+  </p:clrMapOvr>
+</p:notes>
 </file>
 
 <file path=ppt/slideLayouts/slideLayout1.xml><?xml version="1.0" encoding="utf-8"?>
@@ -858,9 +1327,8 @@
           <a:bodyPr/>
           <a:lstStyle/>
           <a:p>
-            <a:fld id="{B61BEF0D-F0BB-DE4B-95CE-6DB70DBA9567}" type="datetimeFigureOut">
-              <a:rPr lang="en-US" smtClean="0"/>
-              <a:pPr/>
+            <a:fld id="{36783BDB-02C3-4768-9E0A-8F30E722D1A1}" type="datetime1">
+              <a:rPr lang="en-US" altLang="ja-JP" smtClean="0"/>
               <a:t>5/15/2020</a:t>
             </a:fld>
             <a:endParaRPr lang="en-US" dirty="0"/>
@@ -1111,9 +1579,8 @@
           <a:bodyPr/>
           <a:lstStyle/>
           <a:p>
-            <a:fld id="{B61BEF0D-F0BB-DE4B-95CE-6DB70DBA9567}" type="datetimeFigureOut">
-              <a:rPr lang="en-US" smtClean="0"/>
-              <a:pPr/>
+            <a:fld id="{0528D208-EB25-4279-BD24-73E6C217856D}" type="datetime1">
+              <a:rPr lang="en-US" altLang="ja-JP" smtClean="0"/>
               <a:t>5/15/2020</a:t>
             </a:fld>
             <a:endParaRPr lang="en-US" dirty="0"/>
@@ -1427,9 +1894,8 @@
           <a:bodyPr/>
           <a:lstStyle/>
           <a:p>
-            <a:fld id="{B61BEF0D-F0BB-DE4B-95CE-6DB70DBA9567}" type="datetimeFigureOut">
-              <a:rPr lang="en-US" smtClean="0"/>
-              <a:pPr/>
+            <a:fld id="{76369C10-83CF-4B2F-B902-84C07B68D315}" type="datetime1">
+              <a:rPr lang="en-US" altLang="ja-JP" smtClean="0"/>
               <a:t>5/15/2020</a:t>
             </a:fld>
             <a:endParaRPr lang="en-US" dirty="0"/>
@@ -1762,9 +2228,8 @@
           <a:bodyPr/>
           <a:lstStyle/>
           <a:p>
-            <a:fld id="{B61BEF0D-F0BB-DE4B-95CE-6DB70DBA9567}" type="datetimeFigureOut">
-              <a:rPr lang="en-US" smtClean="0"/>
-              <a:pPr/>
+            <a:fld id="{FB45C2F2-E16F-4EC9-B523-8C48B6E21372}" type="datetime1">
+              <a:rPr lang="en-US" altLang="ja-JP" smtClean="0"/>
               <a:t>5/15/2020</a:t>
             </a:fld>
             <a:endParaRPr lang="en-US" dirty="0"/>
@@ -2078,9 +2543,8 @@
           <a:bodyPr/>
           <a:lstStyle/>
           <a:p>
-            <a:fld id="{B61BEF0D-F0BB-DE4B-95CE-6DB70DBA9567}" type="datetimeFigureOut">
-              <a:rPr lang="en-US" smtClean="0"/>
-              <a:pPr/>
+            <a:fld id="{CAA320F6-8CDA-4BAE-AEA7-AF88BBA3E4F4}" type="datetime1">
+              <a:rPr lang="en-US" altLang="ja-JP" smtClean="0"/>
               <a:t>5/15/2020</a:t>
             </a:fld>
             <a:endParaRPr lang="en-US" dirty="0"/>
@@ -2473,9 +2937,8 @@
           <a:bodyPr/>
           <a:lstStyle/>
           <a:p>
-            <a:fld id="{B61BEF0D-F0BB-DE4B-95CE-6DB70DBA9567}" type="datetimeFigureOut">
-              <a:rPr lang="en-US" smtClean="0"/>
-              <a:pPr/>
+            <a:fld id="{31113689-B3F1-45AA-957F-39169EF80ED0}" type="datetime1">
+              <a:rPr lang="en-US" altLang="ja-JP" smtClean="0"/>
               <a:t>5/15/2020</a:t>
             </a:fld>
             <a:endParaRPr lang="en-US" dirty="0"/>
@@ -2677,8 +3140,8 @@
           <a:bodyPr/>
           <a:lstStyle/>
           <a:p>
-            <a:fld id="{55C6B4A9-1611-4792-9094-5F34BCA07E0B}" type="datetimeFigureOut">
-              <a:rPr lang="en-US" smtClean="0"/>
+            <a:fld id="{83ED6602-248A-43AC-958E-BB693D0B60A0}" type="datetime1">
+              <a:rPr lang="en-US" altLang="ja-JP" smtClean="0"/>
               <a:t>5/15/2020</a:t>
             </a:fld>
             <a:endParaRPr lang="en-US" dirty="0"/>
@@ -2889,9 +3352,8 @@
           <a:bodyPr/>
           <a:lstStyle/>
           <a:p>
-            <a:fld id="{B61BEF0D-F0BB-DE4B-95CE-6DB70DBA9567}" type="datetimeFigureOut">
-              <a:rPr lang="en-US" smtClean="0"/>
-              <a:pPr/>
+            <a:fld id="{40B89137-3487-4260-9148-011E2C06EBCA}" type="datetime1">
+              <a:rPr lang="en-US" altLang="ja-JP" smtClean="0"/>
               <a:t>5/15/2020</a:t>
             </a:fld>
             <a:endParaRPr lang="en-US" dirty="0"/>
@@ -3093,9 +3555,8 @@
           <a:bodyPr/>
           <a:lstStyle/>
           <a:p>
-            <a:fld id="{B61BEF0D-F0BB-DE4B-95CE-6DB70DBA9567}" type="datetimeFigureOut">
-              <a:rPr lang="en-US" smtClean="0"/>
-              <a:pPr/>
+            <a:fld id="{DF2103DB-EA96-4EB4-939A-270A09B775BB}" type="datetime1">
+              <a:rPr lang="en-US" altLang="ja-JP" smtClean="0"/>
               <a:t>5/15/2020</a:t>
             </a:fld>
             <a:endParaRPr lang="en-US" dirty="0"/>
@@ -3342,9 +3803,8 @@
           <a:bodyPr/>
           <a:lstStyle/>
           <a:p>
-            <a:fld id="{B61BEF0D-F0BB-DE4B-95CE-6DB70DBA9567}" type="datetimeFigureOut">
-              <a:rPr lang="en-US" smtClean="0"/>
-              <a:pPr/>
+            <a:fld id="{464307AA-A9CA-401C-99B9-D85CCA3BD0FA}" type="datetime1">
+              <a:rPr lang="en-US" altLang="ja-JP" smtClean="0"/>
               <a:t>5/15/2020</a:t>
             </a:fld>
             <a:endParaRPr lang="en-US" dirty="0"/>
@@ -3640,8 +4100,8 @@
           <a:bodyPr/>
           <a:lstStyle/>
           <a:p>
-            <a:fld id="{EB712588-04B1-427B-82EE-E8DB90309F08}" type="datetimeFigureOut">
-              <a:rPr lang="en-US" smtClean="0"/>
+            <a:fld id="{607B6C3B-1FA8-40D7-9A22-803BCFA39D02}" type="datetime1">
+              <a:rPr lang="en-US" altLang="ja-JP" smtClean="0"/>
               <a:t>5/15/2020</a:t>
             </a:fld>
             <a:endParaRPr lang="en-US" dirty="0"/>
@@ -4078,9 +4538,8 @@
           <a:bodyPr/>
           <a:lstStyle/>
           <a:p>
-            <a:fld id="{B61BEF0D-F0BB-DE4B-95CE-6DB70DBA9567}" type="datetimeFigureOut">
-              <a:rPr lang="en-US" smtClean="0"/>
-              <a:pPr/>
+            <a:fld id="{4E5F9B74-EFD0-42B5-9E0D-9495AC9023A6}" type="datetime1">
+              <a:rPr lang="en-US" altLang="ja-JP" smtClean="0"/>
               <a:t>5/15/2020</a:t>
             </a:fld>
             <a:endParaRPr lang="en-US" dirty="0"/>
@@ -4203,9 +4662,8 @@
           <a:bodyPr/>
           <a:lstStyle/>
           <a:p>
-            <a:fld id="{B61BEF0D-F0BB-DE4B-95CE-6DB70DBA9567}" type="datetimeFigureOut">
-              <a:rPr lang="en-US" smtClean="0"/>
-              <a:pPr/>
+            <a:fld id="{A9B02F04-576A-4548-A7EE-4D4E80B326F8}" type="datetime1">
+              <a:rPr lang="en-US" altLang="ja-JP" smtClean="0"/>
               <a:t>5/15/2020</a:t>
             </a:fld>
             <a:endParaRPr lang="en-US" dirty="0"/>
@@ -4300,9 +4758,8 @@
           <a:bodyPr/>
           <a:lstStyle/>
           <a:p>
-            <a:fld id="{B61BEF0D-F0BB-DE4B-95CE-6DB70DBA9567}" type="datetimeFigureOut">
-              <a:rPr lang="en-US" smtClean="0"/>
-              <a:pPr/>
+            <a:fld id="{F97EAC46-0AD7-4EC1-88A1-A8F9E8A423E7}" type="datetime1">
+              <a:rPr lang="en-US" altLang="ja-JP" smtClean="0"/>
               <a:t>5/15/2020</a:t>
             </a:fld>
             <a:endParaRPr lang="en-US" dirty="0"/>
@@ -4589,8 +5046,8 @@
           <a:bodyPr/>
           <a:lstStyle/>
           <a:p>
-            <a:fld id="{42A54C80-263E-416B-A8E0-580EDEADCBDC}" type="datetimeFigureOut">
-              <a:rPr lang="en-US" smtClean="0"/>
+            <a:fld id="{186A5954-0A84-4E1F-AC52-2E1AFB2842E0}" type="datetime1">
+              <a:rPr lang="en-US" altLang="ja-JP" smtClean="0"/>
               <a:t>5/15/2020</a:t>
             </a:fld>
             <a:endParaRPr lang="en-US" dirty="0"/>
@@ -4895,9 +5352,8 @@
           <a:bodyPr/>
           <a:lstStyle/>
           <a:p>
-            <a:fld id="{B61BEF0D-F0BB-DE4B-95CE-6DB70DBA9567}" type="datetimeFigureOut">
-              <a:rPr lang="en-US" smtClean="0"/>
-              <a:pPr/>
+            <a:fld id="{38D60469-8900-487A-AC37-562AD42B9246}" type="datetime1">
+              <a:rPr lang="en-US" altLang="ja-JP" smtClean="0"/>
               <a:t>5/15/2020</a:t>
             </a:fld>
             <a:endParaRPr lang="en-US" dirty="0"/>
@@ -5630,9 +6086,8 @@
             </a:lvl1pPr>
           </a:lstStyle>
           <a:p>
-            <a:fld id="{B61BEF0D-F0BB-DE4B-95CE-6DB70DBA9567}" type="datetimeFigureOut">
-              <a:rPr lang="en-US" smtClean="0"/>
-              <a:pPr/>
+            <a:fld id="{2B47066E-4B19-4895-926F-6224AB1F3A15}" type="datetime1">
+              <a:rPr lang="en-US" altLang="ja-JP" smtClean="0"/>
               <a:t>5/15/2020</a:t>
             </a:fld>
             <a:endParaRPr lang="en-US" dirty="0"/>
@@ -5742,6 +6197,7 @@
     <p:sldLayoutId id="2147483683" r:id="rId15"/>
     <p:sldLayoutId id="2147483684" r:id="rId16"/>
   </p:sldLayoutIdLst>
+  <p:hf hdr="0" ftr="0" dt="0"/>
   <p:txStyles>
     <p:titleStyle>
       <a:lvl1pPr algn="l" defTabSz="457200" rtl="0" eaLnBrk="1" latinLnBrk="0" hangingPunct="1">
@@ -6163,7 +6619,7 @@
           <p:cNvPr id="2" name="タイトル 1">
             <a:extLst>
               <a:ext uri="{FF2B5EF4-FFF2-40B4-BE49-F238E27FC236}">
-                <a16:creationId xmlns:a16="http://schemas.microsoft.com/office/drawing/2014/main" id="{C57EB9FD-5A6F-42D4-A4DA-60170F878C31}"/>
+                <a16:creationId xmlns:a16="http://schemas.microsoft.com/office/drawing/2014/main" xmlns="" id="{C57EB9FD-5A6F-42D4-A4DA-60170F878C31}"/>
               </a:ext>
             </a:extLst>
           </p:cNvPr>
@@ -6177,7 +6633,7 @@
         <p:spPr>
           <a:xfrm>
             <a:off x="-221225" y="545690"/>
-            <a:ext cx="10722078" cy="3357662"/>
+            <a:ext cx="9814404" cy="3357662"/>
           </a:xfrm>
         </p:spPr>
         <p:txBody>
@@ -6185,7 +6641,7 @@
           <a:lstStyle/>
           <a:p>
             <a:r>
-              <a:rPr kumimoji="1" lang="en-US" altLang="ja-JP" dirty="0">
+              <a:rPr kumimoji="1" lang="en-US" altLang="ja-JP" sz="4400" dirty="0">
                 <a:solidFill>
                   <a:schemeClr val="tx1"/>
                 </a:solidFill>
@@ -6193,7 +6649,7 @@
               <a:t>『</a:t>
             </a:r>
             <a:r>
-              <a:rPr kumimoji="1" lang="ja-JP" altLang="en-US" dirty="0">
+              <a:rPr kumimoji="1" lang="ja-JP" altLang="en-US" sz="4400" dirty="0">
                 <a:solidFill>
                   <a:schemeClr val="tx1"/>
                 </a:solidFill>
@@ -6201,7 +6657,7 @@
               <a:t>共有</a:t>
             </a:r>
             <a:r>
-              <a:rPr kumimoji="1" lang="en-US" altLang="ja-JP" dirty="0" err="1">
+              <a:rPr kumimoji="1" lang="en-US" altLang="ja-JP" sz="4400" dirty="0" err="1">
                 <a:solidFill>
                   <a:schemeClr val="tx1"/>
                 </a:solidFill>
@@ -6209,7 +6665,7 @@
               <a:t>Todo</a:t>
             </a:r>
             <a:r>
-              <a:rPr kumimoji="1" lang="ja-JP" altLang="en-US" dirty="0">
+              <a:rPr kumimoji="1" lang="ja-JP" altLang="en-US" sz="4400" dirty="0">
                 <a:solidFill>
                   <a:schemeClr val="tx1"/>
                 </a:solidFill>
@@ -6217,7 +6673,7 @@
               <a:t>リスト</a:t>
             </a:r>
             <a:r>
-              <a:rPr kumimoji="1" lang="en-US" altLang="ja-JP" dirty="0">
+              <a:rPr kumimoji="1" lang="en-US" altLang="ja-JP" sz="4400" dirty="0">
                 <a:solidFill>
                   <a:schemeClr val="tx1"/>
                 </a:solidFill>
@@ -6225,13 +6681,65 @@
               <a:t>』</a:t>
             </a:r>
             <a:r>
-              <a:rPr kumimoji="1" lang="ja-JP" altLang="en-US" dirty="0">
+              <a:rPr kumimoji="1" lang="ja-JP" altLang="en-US" sz="4400" dirty="0">
                 <a:solidFill>
                   <a:schemeClr val="tx1"/>
                 </a:solidFill>
               </a:rPr>
-              <a:t>作成における進捗状況報告書</a:t>
-            </a:r>
+              <a:t>作成に</a:t>
+            </a:r>
+            <a:r>
+              <a:rPr kumimoji="1" lang="ja-JP" altLang="en-US" sz="4400" dirty="0" smtClean="0">
+                <a:solidFill>
+                  <a:schemeClr val="tx1"/>
+                </a:solidFill>
+              </a:rPr>
+              <a:t>おける</a:t>
+            </a:r>
+            <a:r>
+              <a:rPr kumimoji="1" lang="en-US" altLang="ja-JP" sz="4400" dirty="0" smtClean="0">
+                <a:solidFill>
+                  <a:schemeClr val="tx1"/>
+                </a:solidFill>
+              </a:rPr>
+              <a:t/>
+            </a:r>
+            <a:br>
+              <a:rPr kumimoji="1" lang="en-US" altLang="ja-JP" sz="4400" dirty="0" smtClean="0">
+                <a:solidFill>
+                  <a:schemeClr val="tx1"/>
+                </a:solidFill>
+              </a:rPr>
+            </a:br>
+            <a:r>
+              <a:rPr kumimoji="1" lang="ja-JP" altLang="en-US" sz="4400" dirty="0" smtClean="0">
+                <a:solidFill>
+                  <a:schemeClr val="tx1"/>
+                </a:solidFill>
+              </a:rPr>
+              <a:t>進捗</a:t>
+            </a:r>
+            <a:r>
+              <a:rPr kumimoji="1" lang="ja-JP" altLang="en-US" sz="4400" dirty="0">
+                <a:solidFill>
+                  <a:schemeClr val="tx1"/>
+                </a:solidFill>
+              </a:rPr>
+              <a:t>状況</a:t>
+            </a:r>
+            <a:r>
+              <a:rPr kumimoji="1" lang="ja-JP" altLang="en-US" sz="4400" dirty="0" smtClean="0">
+                <a:solidFill>
+                  <a:schemeClr val="tx1"/>
+                </a:solidFill>
+              </a:rPr>
+              <a:t>報告</a:t>
+            </a:r>
+            <a:endParaRPr kumimoji="1" lang="ja-JP" altLang="en-US" sz="4400" dirty="0">
+              <a:solidFill>
+                <a:schemeClr val="tx1"/>
+              </a:solidFill>
+            </a:endParaRPr>
           </a:p>
         </p:txBody>
       </p:sp>
@@ -6240,7 +6748,7 @@
           <p:cNvPr id="3" name="字幕 2">
             <a:extLst>
               <a:ext uri="{FF2B5EF4-FFF2-40B4-BE49-F238E27FC236}">
-                <a16:creationId xmlns:a16="http://schemas.microsoft.com/office/drawing/2014/main" id="{3AC314D0-9A19-438A-B516-27641CECABE8}"/>
+                <a16:creationId xmlns:a16="http://schemas.microsoft.com/office/drawing/2014/main" xmlns="" id="{3AC314D0-9A19-438A-B516-27641CECABE8}"/>
               </a:ext>
             </a:extLst>
           </p:cNvPr>
@@ -6254,7 +6762,7 @@
         <p:spPr>
           <a:xfrm>
             <a:off x="0" y="4154072"/>
-            <a:ext cx="9819694" cy="2158238"/>
+            <a:ext cx="9593179" cy="2158238"/>
           </a:xfrm>
         </p:spPr>
         <p:txBody>
@@ -6322,6 +6830,68 @@
             <a:endParaRPr kumimoji="1" lang="ja-JP" altLang="en-US" dirty="0">
               <a:solidFill>
                 <a:schemeClr val="tx1"/>
+              </a:solidFill>
+            </a:endParaRPr>
+          </a:p>
+        </p:txBody>
+      </p:sp>
+      <p:sp>
+        <p:nvSpPr>
+          <p:cNvPr id="4" name="テキスト ボックス 3"/>
+          <p:cNvSpPr txBox="1"/>
+          <p:nvPr/>
+        </p:nvSpPr>
+        <p:spPr>
+          <a:xfrm>
+            <a:off x="6673516" y="4154072"/>
+            <a:ext cx="1106905" cy="369332"/>
+          </a:xfrm>
+          <a:prstGeom prst="rect">
+            <a:avLst/>
+          </a:prstGeom>
+          <a:noFill/>
+        </p:spPr>
+        <p:txBody>
+          <a:bodyPr wrap="square" rtlCol="0">
+            <a:spAutoFit/>
+          </a:bodyPr>
+          <a:lstStyle/>
+          <a:p>
+            <a:r>
+              <a:rPr kumimoji="1" lang="ja-JP" altLang="en-US" dirty="0" smtClean="0"/>
+              <a:t>Ｇ１</a:t>
+            </a:r>
+            <a:endParaRPr kumimoji="1" lang="ja-JP" altLang="en-US" dirty="0"/>
+          </a:p>
+        </p:txBody>
+      </p:sp>
+      <p:sp>
+        <p:nvSpPr>
+          <p:cNvPr id="5" name="スライド番号プレースホルダー 4"/>
+          <p:cNvSpPr>
+            <a:spLocks noGrp="1"/>
+          </p:cNvSpPr>
+          <p:nvPr>
+            <p:ph type="sldNum" sz="quarter" idx="12"/>
+          </p:nvPr>
+        </p:nvSpPr>
+        <p:spPr/>
+        <p:txBody>
+          <a:bodyPr/>
+          <a:lstStyle/>
+          <a:p>
+            <a:fld id="{D57F1E4F-1CFF-5643-939E-217C01CDF565}" type="slidenum">
+              <a:rPr lang="en-US" sz="2000" smtClean="0">
+                <a:solidFill>
+                  <a:schemeClr val="bg1"/>
+                </a:solidFill>
+              </a:rPr>
+              <a:pPr/>
+              <a:t>1</a:t>
+            </a:fld>
+            <a:endParaRPr lang="en-US" sz="2000" dirty="0">
+              <a:solidFill>
+                <a:schemeClr val="bg1"/>
               </a:solidFill>
             </a:endParaRPr>
           </a:p>
@@ -6362,7 +6932,7 @@
           <p:cNvPr id="2" name="タイトル 1">
             <a:extLst>
               <a:ext uri="{FF2B5EF4-FFF2-40B4-BE49-F238E27FC236}">
-                <a16:creationId xmlns:a16="http://schemas.microsoft.com/office/drawing/2014/main" id="{02FFFE6E-26BE-4A9A-9133-E2E5B4180407}"/>
+                <a16:creationId xmlns:a16="http://schemas.microsoft.com/office/drawing/2014/main" xmlns="" id="{02FFFE6E-26BE-4A9A-9133-E2E5B4180407}"/>
               </a:ext>
             </a:extLst>
           </p:cNvPr>
@@ -6381,17 +6951,25 @@
         </p:spPr>
         <p:txBody>
           <a:bodyPr>
-            <a:normAutofit fontScale="90000"/>
+            <a:normAutofit/>
           </a:bodyPr>
           <a:lstStyle/>
           <a:p>
             <a:r>
-              <a:rPr lang="ja-JP" altLang="en-US" dirty="0">
+              <a:rPr lang="ja-JP" altLang="en-US" sz="4000" dirty="0" smtClean="0">
                 <a:solidFill>
                   <a:schemeClr val="tx1"/>
                 </a:solidFill>
               </a:rPr>
-              <a:t>はじめに、、、</a:t>
+              <a:t>・はじめに</a:t>
+            </a:r>
+            <a:r>
+              <a:rPr lang="en-US" altLang="ja-JP" dirty="0">
+                <a:solidFill>
+                  <a:schemeClr val="tx1"/>
+                </a:solidFill>
+              </a:rPr>
+              <a:t/>
             </a:r>
             <a:br>
               <a:rPr lang="en-US" altLang="ja-JP" dirty="0">
@@ -6400,6 +6978,14 @@
                 </a:solidFill>
               </a:rPr>
             </a:br>
+            <a:r>
+              <a:rPr lang="en-US" altLang="ja-JP" dirty="0">
+                <a:solidFill>
+                  <a:schemeClr val="tx1"/>
+                </a:solidFill>
+              </a:rPr>
+              <a:t/>
+            </a:r>
             <a:br>
               <a:rPr lang="en-US" altLang="ja-JP" dirty="0">
                 <a:solidFill>
@@ -6408,42 +6994,82 @@
               </a:rPr>
             </a:br>
             <a:r>
-              <a:rPr lang="ja-JP" altLang="en-US" dirty="0">
+              <a:rPr lang="ja-JP" altLang="en-US" sz="2800" dirty="0">
                 <a:solidFill>
                   <a:schemeClr val="tx1"/>
                 </a:solidFill>
               </a:rPr>
               <a:t>進捗状況をまとめる際に、勘違いで</a:t>
             </a:r>
+            <a:r>
+              <a:rPr lang="en-US" altLang="ja-JP" sz="2800" dirty="0">
+                <a:solidFill>
+                  <a:schemeClr val="tx1"/>
+                </a:solidFill>
+              </a:rPr>
+              <a:t/>
+            </a:r>
             <a:br>
-              <a:rPr lang="en-US" altLang="ja-JP" dirty="0">
+              <a:rPr lang="en-US" altLang="ja-JP" sz="2800" dirty="0">
                 <a:solidFill>
                   <a:schemeClr val="tx1"/>
                 </a:solidFill>
               </a:rPr>
             </a:br>
             <a:r>
-              <a:rPr lang="ja-JP" altLang="en-US" dirty="0">
+              <a:rPr lang="en-US" altLang="ja-JP" sz="2800" dirty="0" smtClean="0">
                 <a:solidFill>
                   <a:schemeClr val="tx1"/>
                 </a:solidFill>
               </a:rPr>
-              <a:t>ｍｄ記法でまとめてしまったので</a:t>
+              <a:t>md</a:t>
+            </a:r>
+            <a:r>
+              <a:rPr lang="ja-JP" altLang="en-US" sz="2800" dirty="0" smtClean="0">
+                <a:solidFill>
+                  <a:schemeClr val="tx1"/>
+                </a:solidFill>
+              </a:rPr>
+              <a:t>記法</a:t>
+            </a:r>
+            <a:r>
+              <a:rPr lang="ja-JP" altLang="en-US" sz="2800" dirty="0">
+                <a:solidFill>
+                  <a:schemeClr val="tx1"/>
+                </a:solidFill>
+              </a:rPr>
+              <a:t>でまとめてしまったので</a:t>
+            </a:r>
+            <a:r>
+              <a:rPr lang="en-US" altLang="ja-JP" sz="2800" dirty="0">
+                <a:solidFill>
+                  <a:schemeClr val="tx1"/>
+                </a:solidFill>
+              </a:rPr>
+              <a:t/>
             </a:r>
             <a:br>
-              <a:rPr lang="en-US" altLang="ja-JP" dirty="0">
+              <a:rPr lang="en-US" altLang="ja-JP" sz="2800" dirty="0">
                 <a:solidFill>
                   <a:schemeClr val="tx1"/>
                 </a:solidFill>
               </a:rPr>
             </a:br>
             <a:r>
-              <a:rPr lang="ja-JP" altLang="en-US" dirty="0">
+              <a:rPr lang="ja-JP" altLang="en-US" sz="2800" dirty="0">
                 <a:solidFill>
                   <a:schemeClr val="tx1"/>
                 </a:solidFill>
               </a:rPr>
               <a:t>今回はそれを貼らせていただきます。</a:t>
+            </a:r>
+            <a:r>
+              <a:rPr lang="en-US" altLang="ja-JP" dirty="0">
+                <a:solidFill>
+                  <a:schemeClr val="tx1"/>
+                </a:solidFill>
+              </a:rPr>
+              <a:t/>
             </a:r>
             <a:br>
               <a:rPr lang="en-US" altLang="ja-JP" dirty="0">
@@ -6457,6 +7083,30 @@
                 <a:schemeClr val="tx1"/>
               </a:solidFill>
             </a:endParaRPr>
+          </a:p>
+        </p:txBody>
+      </p:sp>
+      <p:sp>
+        <p:nvSpPr>
+          <p:cNvPr id="3" name="スライド番号プレースホルダー 2"/>
+          <p:cNvSpPr>
+            <a:spLocks noGrp="1"/>
+          </p:cNvSpPr>
+          <p:nvPr>
+            <p:ph type="sldNum" sz="quarter" idx="12"/>
+          </p:nvPr>
+        </p:nvSpPr>
+        <p:spPr/>
+        <p:txBody>
+          <a:bodyPr/>
+          <a:lstStyle/>
+          <a:p>
+            <a:fld id="{D57F1E4F-1CFF-5643-939E-217C01CDF565}" type="slidenum">
+              <a:rPr lang="en-US" sz="2000" smtClean="0"/>
+              <a:pPr/>
+              <a:t>2</a:t>
+            </a:fld>
+            <a:endParaRPr lang="en-US" sz="2000" dirty="0"/>
           </a:p>
         </p:txBody>
       </p:sp>
@@ -6495,7 +7145,7 @@
           <p:cNvPr id="3" name="図 2">
             <a:extLst>
               <a:ext uri="{FF2B5EF4-FFF2-40B4-BE49-F238E27FC236}">
-                <a16:creationId xmlns:a16="http://schemas.microsoft.com/office/drawing/2014/main" id="{E63580CA-4C15-4FE5-9AC9-128EC6EA9B13}"/>
+                <a16:creationId xmlns:a16="http://schemas.microsoft.com/office/drawing/2014/main" xmlns="" id="{E63580CA-4C15-4FE5-9AC9-128EC6EA9B13}"/>
               </a:ext>
             </a:extLst>
           </p:cNvPr>
@@ -6519,6 +7169,30 @@
           </a:prstGeom>
         </p:spPr>
       </p:pic>
+      <p:sp>
+        <p:nvSpPr>
+          <p:cNvPr id="2" name="スライド番号プレースホルダー 1"/>
+          <p:cNvSpPr>
+            <a:spLocks noGrp="1"/>
+          </p:cNvSpPr>
+          <p:nvPr>
+            <p:ph type="sldNum" sz="quarter" idx="12"/>
+          </p:nvPr>
+        </p:nvSpPr>
+        <p:spPr/>
+        <p:txBody>
+          <a:bodyPr/>
+          <a:lstStyle/>
+          <a:p>
+            <a:fld id="{D57F1E4F-1CFF-5643-939E-217C01CDF565}" type="slidenum">
+              <a:rPr lang="en-US" sz="2000" smtClean="0"/>
+              <a:pPr/>
+              <a:t>3</a:t>
+            </a:fld>
+            <a:endParaRPr lang="en-US" sz="2000" dirty="0"/>
+          </a:p>
+        </p:txBody>
+      </p:sp>
     </p:spTree>
     <p:extLst>
       <p:ext uri="{BB962C8B-B14F-4D97-AF65-F5344CB8AC3E}">
@@ -6554,7 +7228,7 @@
           <p:cNvPr id="3" name="図 2">
             <a:extLst>
               <a:ext uri="{FF2B5EF4-FFF2-40B4-BE49-F238E27FC236}">
-                <a16:creationId xmlns:a16="http://schemas.microsoft.com/office/drawing/2014/main" id="{98E5BF74-E3C3-497B-8C9C-30B1EB41217B}"/>
+                <a16:creationId xmlns:a16="http://schemas.microsoft.com/office/drawing/2014/main" xmlns="" id="{98E5BF74-E3C3-497B-8C9C-30B1EB41217B}"/>
               </a:ext>
             </a:extLst>
           </p:cNvPr>
@@ -6564,7 +7238,7 @@
           <p:nvPr/>
         </p:nvPicPr>
         <p:blipFill rotWithShape="1">
-          <a:blip r:embed="rId2"/>
+          <a:blip r:embed="rId3"/>
           <a:srcRect l="17187" t="57083" r="18489" b="24861"/>
           <a:stretch/>
         </p:blipFill>
@@ -6578,6 +7252,59 @@
           </a:prstGeom>
         </p:spPr>
       </p:pic>
+      <p:sp>
+        <p:nvSpPr>
+          <p:cNvPr id="2" name="テキスト ボックス 1"/>
+          <p:cNvSpPr txBox="1"/>
+          <p:nvPr/>
+        </p:nvSpPr>
+        <p:spPr>
+          <a:xfrm>
+            <a:off x="8237621" y="5253789"/>
+            <a:ext cx="800219" cy="461665"/>
+          </a:xfrm>
+          <a:prstGeom prst="rect">
+            <a:avLst/>
+          </a:prstGeom>
+          <a:noFill/>
+        </p:spPr>
+        <p:txBody>
+          <a:bodyPr wrap="none" rtlCol="0">
+            <a:spAutoFit/>
+          </a:bodyPr>
+          <a:lstStyle/>
+          <a:p>
+            <a:r>
+              <a:rPr kumimoji="1" lang="ja-JP" altLang="en-US" sz="2400" dirty="0"/>
+              <a:t>以上</a:t>
+            </a:r>
+          </a:p>
+        </p:txBody>
+      </p:sp>
+      <p:sp>
+        <p:nvSpPr>
+          <p:cNvPr id="4" name="スライド番号プレースホルダー 3"/>
+          <p:cNvSpPr>
+            <a:spLocks noGrp="1"/>
+          </p:cNvSpPr>
+          <p:nvPr>
+            <p:ph type="sldNum" sz="quarter" idx="12"/>
+          </p:nvPr>
+        </p:nvSpPr>
+        <p:spPr/>
+        <p:txBody>
+          <a:bodyPr/>
+          <a:lstStyle/>
+          <a:p>
+            <a:fld id="{D57F1E4F-1CFF-5643-939E-217C01CDF565}" type="slidenum">
+              <a:rPr lang="en-US" sz="2000" smtClean="0"/>
+              <a:pPr/>
+              <a:t>4</a:t>
+            </a:fld>
+            <a:endParaRPr lang="en-US" sz="2000" dirty="0"/>
+          </a:p>
+        </p:txBody>
+      </p:sp>
     </p:spTree>
     <p:extLst>
       <p:ext uri="{BB962C8B-B14F-4D97-AF65-F5344CB8AC3E}">
@@ -6846,4 +7573,265 @@
     </a:ext>
   </a:extLst>
 </a:theme>
+</file>
+
+<file path=ppt/theme/theme2.xml><?xml version="1.0" encoding="utf-8"?>
+<a:theme xmlns:a="http://schemas.openxmlformats.org/drawingml/2006/main" name="Office テーマ">
+  <a:themeElements>
+    <a:clrScheme name="Office">
+      <a:dk1>
+        <a:sysClr val="windowText" lastClr="000000"/>
+      </a:dk1>
+      <a:lt1>
+        <a:sysClr val="window" lastClr="FFFFFF"/>
+      </a:lt1>
+      <a:dk2>
+        <a:srgbClr val="44546A"/>
+      </a:dk2>
+      <a:lt2>
+        <a:srgbClr val="E7E6E6"/>
+      </a:lt2>
+      <a:accent1>
+        <a:srgbClr val="5B9BD5"/>
+      </a:accent1>
+      <a:accent2>
+        <a:srgbClr val="ED7D31"/>
+      </a:accent2>
+      <a:accent3>
+        <a:srgbClr val="A5A5A5"/>
+      </a:accent3>
+      <a:accent4>
+        <a:srgbClr val="FFC000"/>
+      </a:accent4>
+      <a:accent5>
+        <a:srgbClr val="4472C4"/>
+      </a:accent5>
+      <a:accent6>
+        <a:srgbClr val="70AD47"/>
+      </a:accent6>
+      <a:hlink>
+        <a:srgbClr val="0563C1"/>
+      </a:hlink>
+      <a:folHlink>
+        <a:srgbClr val="954F72"/>
+      </a:folHlink>
+    </a:clrScheme>
+    <a:fontScheme name="Office">
+      <a:majorFont>
+        <a:latin typeface="Calibri Light" panose="020F0302020204030204"/>
+        <a:ea typeface=""/>
+        <a:cs typeface=""/>
+        <a:font script="Jpan" typeface="ＭＳ Ｐゴシック"/>
+        <a:font script="Hang" typeface="맑은 고딕"/>
+        <a:font script="Hans" typeface="宋体"/>
+        <a:font script="Hant" typeface="新細明體"/>
+        <a:font script="Arab" typeface="Times New Roman"/>
+        <a:font script="Hebr" typeface="Times New Roman"/>
+        <a:font script="Thai" typeface="Angsana New"/>
+        <a:font script="Ethi" typeface="Nyala"/>
+        <a:font script="Beng" typeface="Vrinda"/>
+        <a:font script="Gujr" typeface="Shruti"/>
+        <a:font script="Khmr" typeface="MoolBoran"/>
+        <a:font script="Knda" typeface="Tunga"/>
+        <a:font script="Guru" typeface="Raavi"/>
+        <a:font script="Cans" typeface="Euphemia"/>
+        <a:font script="Cher" typeface="Plantagenet Cherokee"/>
+        <a:font script="Yiii" typeface="Microsoft Yi Baiti"/>
+        <a:font script="Tibt" typeface="Microsoft Himalaya"/>
+        <a:font script="Thaa" typeface="MV Boli"/>
+        <a:font script="Deva" typeface="Mangal"/>
+        <a:font script="Telu" typeface="Gautami"/>
+        <a:font script="Taml" typeface="Latha"/>
+        <a:font script="Syrc" typeface="Estrangelo Edessa"/>
+        <a:font script="Orya" typeface="Kalinga"/>
+        <a:font script="Mlym" typeface="Kartika"/>
+        <a:font script="Laoo" typeface="DokChampa"/>
+        <a:font script="Sinh" typeface="Iskoola Pota"/>
+        <a:font script="Mong" typeface="Mongolian Baiti"/>
+        <a:font script="Viet" typeface="Times New Roman"/>
+        <a:font script="Uigh" typeface="Microsoft Uighur"/>
+        <a:font script="Geor" typeface="Sylfaen"/>
+      </a:majorFont>
+      <a:minorFont>
+        <a:latin typeface="Calibri" panose="020F0502020204030204"/>
+        <a:ea typeface=""/>
+        <a:cs typeface=""/>
+        <a:font script="Jpan" typeface="ＭＳ Ｐゴシック"/>
+        <a:font script="Hang" typeface="맑은 고딕"/>
+        <a:font script="Hans" typeface="宋体"/>
+        <a:font script="Hant" typeface="新細明體"/>
+        <a:font script="Arab" typeface="Arial"/>
+        <a:font script="Hebr" typeface="Arial"/>
+        <a:font script="Thai" typeface="Cordia New"/>
+        <a:font script="Ethi" typeface="Nyala"/>
+        <a:font script="Beng" typeface="Vrinda"/>
+        <a:font script="Gujr" typeface="Shruti"/>
+        <a:font script="Khmr" typeface="DaunPenh"/>
+        <a:font script="Knda" typeface="Tunga"/>
+        <a:font script="Guru" typeface="Raavi"/>
+        <a:font script="Cans" typeface="Euphemia"/>
+        <a:font script="Cher" typeface="Plantagenet Cherokee"/>
+        <a:font script="Yiii" typeface="Microsoft Yi Baiti"/>
+        <a:font script="Tibt" typeface="Microsoft Himalaya"/>
+        <a:font script="Thaa" typeface="MV Boli"/>
+        <a:font script="Deva" typeface="Mangal"/>
+        <a:font script="Telu" typeface="Gautami"/>
+        <a:font script="Taml" typeface="Latha"/>
+        <a:font script="Syrc" typeface="Estrangelo Edessa"/>
+        <a:font script="Orya" typeface="Kalinga"/>
+        <a:font script="Mlym" typeface="Kartika"/>
+        <a:font script="Laoo" typeface="DokChampa"/>
+        <a:font script="Sinh" typeface="Iskoola Pota"/>
+        <a:font script="Mong" typeface="Mongolian Baiti"/>
+        <a:font script="Viet" typeface="Arial"/>
+        <a:font script="Uigh" typeface="Microsoft Uighur"/>
+        <a:font script="Geor" typeface="Sylfaen"/>
+      </a:minorFont>
+    </a:fontScheme>
+    <a:fmtScheme name="Office">
+      <a:fillStyleLst>
+        <a:solidFill>
+          <a:schemeClr val="phClr"/>
+        </a:solidFill>
+        <a:gradFill rotWithShape="1">
+          <a:gsLst>
+            <a:gs pos="0">
+              <a:schemeClr val="phClr">
+                <a:lumMod val="110000"/>
+                <a:satMod val="105000"/>
+                <a:tint val="67000"/>
+              </a:schemeClr>
+            </a:gs>
+            <a:gs pos="50000">
+              <a:schemeClr val="phClr">
+                <a:lumMod val="105000"/>
+                <a:satMod val="103000"/>
+                <a:tint val="73000"/>
+              </a:schemeClr>
+            </a:gs>
+            <a:gs pos="100000">
+              <a:schemeClr val="phClr">
+                <a:lumMod val="105000"/>
+                <a:satMod val="109000"/>
+                <a:tint val="81000"/>
+              </a:schemeClr>
+            </a:gs>
+          </a:gsLst>
+          <a:lin ang="5400000" scaled="0"/>
+        </a:gradFill>
+        <a:gradFill rotWithShape="1">
+          <a:gsLst>
+            <a:gs pos="0">
+              <a:schemeClr val="phClr">
+                <a:satMod val="103000"/>
+                <a:lumMod val="102000"/>
+                <a:tint val="94000"/>
+              </a:schemeClr>
+            </a:gs>
+            <a:gs pos="50000">
+              <a:schemeClr val="phClr">
+                <a:satMod val="110000"/>
+                <a:lumMod val="100000"/>
+                <a:shade val="100000"/>
+              </a:schemeClr>
+            </a:gs>
+            <a:gs pos="100000">
+              <a:schemeClr val="phClr">
+                <a:lumMod val="99000"/>
+                <a:satMod val="120000"/>
+                <a:shade val="78000"/>
+              </a:schemeClr>
+            </a:gs>
+          </a:gsLst>
+          <a:lin ang="5400000" scaled="0"/>
+        </a:gradFill>
+      </a:fillStyleLst>
+      <a:lnStyleLst>
+        <a:ln w="6350" cap="flat" cmpd="sng" algn="ctr">
+          <a:solidFill>
+            <a:schemeClr val="phClr"/>
+          </a:solidFill>
+          <a:prstDash val="solid"/>
+          <a:miter lim="800000"/>
+        </a:ln>
+        <a:ln w="12700" cap="flat" cmpd="sng" algn="ctr">
+          <a:solidFill>
+            <a:schemeClr val="phClr"/>
+          </a:solidFill>
+          <a:prstDash val="solid"/>
+          <a:miter lim="800000"/>
+        </a:ln>
+        <a:ln w="19050" cap="flat" cmpd="sng" algn="ctr">
+          <a:solidFill>
+            <a:schemeClr val="phClr"/>
+          </a:solidFill>
+          <a:prstDash val="solid"/>
+          <a:miter lim="800000"/>
+        </a:ln>
+      </a:lnStyleLst>
+      <a:effectStyleLst>
+        <a:effectStyle>
+          <a:effectLst/>
+        </a:effectStyle>
+        <a:effectStyle>
+          <a:effectLst/>
+        </a:effectStyle>
+        <a:effectStyle>
+          <a:effectLst>
+            <a:outerShdw blurRad="57150" dist="19050" dir="5400000" algn="ctr" rotWithShape="0">
+              <a:srgbClr val="000000">
+                <a:alpha val="63000"/>
+              </a:srgbClr>
+            </a:outerShdw>
+          </a:effectLst>
+        </a:effectStyle>
+      </a:effectStyleLst>
+      <a:bgFillStyleLst>
+        <a:solidFill>
+          <a:schemeClr val="phClr"/>
+        </a:solidFill>
+        <a:solidFill>
+          <a:schemeClr val="phClr">
+            <a:tint val="95000"/>
+            <a:satMod val="170000"/>
+          </a:schemeClr>
+        </a:solidFill>
+        <a:gradFill rotWithShape="1">
+          <a:gsLst>
+            <a:gs pos="0">
+              <a:schemeClr val="phClr">
+                <a:tint val="93000"/>
+                <a:satMod val="150000"/>
+                <a:shade val="98000"/>
+                <a:lumMod val="102000"/>
+              </a:schemeClr>
+            </a:gs>
+            <a:gs pos="50000">
+              <a:schemeClr val="phClr">
+                <a:tint val="98000"/>
+                <a:satMod val="130000"/>
+                <a:shade val="90000"/>
+                <a:lumMod val="103000"/>
+              </a:schemeClr>
+            </a:gs>
+            <a:gs pos="100000">
+              <a:schemeClr val="phClr">
+                <a:shade val="63000"/>
+                <a:satMod val="120000"/>
+              </a:schemeClr>
+            </a:gs>
+          </a:gsLst>
+          <a:lin ang="5400000" scaled="0"/>
+        </a:gradFill>
+      </a:bgFillStyleLst>
+    </a:fmtScheme>
+  </a:themeElements>
+  <a:objectDefaults/>
+  <a:extraClrSchemeLst/>
+  <a:extLst>
+    <a:ext uri="{05A4C25C-085E-4340-85A3-A5531E510DB2}">
+      <thm15:themeFamily xmlns:thm15="http://schemas.microsoft.com/office/thememl/2012/main" name="Office Theme" id="{62F939B6-93AF-4DB8-9C6B-D6C7DFDC589F}" vid="{4A3C46E8-61CC-4603-A589-7422A47A8E4A}"/>
+    </a:ext>
+  </a:extLst>
+</a:theme>
 </file>
</xml_diff>